<commit_message>
Actualización del diagrama de estructura de datos
</commit_message>
<xml_diff>
--- a/src/bbdd/DiagramaEstructuraDeDatos.pptx
+++ b/src/bbdd/DiagramaEstructuraDeDatos.pptx
@@ -104,6 +104,11 @@
       </a:defRPr>
     </a:lvl9pPr>
   </p:defaultTextStyle>
+  <p:extLst>
+    <p:ext uri="{EFAFB233-063F-42B5-8137-9DF3F51BA10A}">
+      <p15:sldGuideLst xmlns:p15="http://schemas.microsoft.com/office/powerpoint/2012/main"/>
+    </p:ext>
+  </p:extLst>
 </p:presentation>
 </file>
 
@@ -256,7 +261,7 @@
           <a:p>
             <a:fld id="{645AD960-D2B6-4147-9B4B-B3754CA6EB06}" type="datetimeFigureOut">
               <a:rPr lang="en-NL" smtClean="0"/>
-              <a:t>29/04/2021</a:t>
+              <a:t>30/04/2021</a:t>
             </a:fld>
             <a:endParaRPr lang="en-NL"/>
           </a:p>
@@ -456,7 +461,7 @@
           <a:p>
             <a:fld id="{645AD960-D2B6-4147-9B4B-B3754CA6EB06}" type="datetimeFigureOut">
               <a:rPr lang="en-NL" smtClean="0"/>
-              <a:t>29/04/2021</a:t>
+              <a:t>30/04/2021</a:t>
             </a:fld>
             <a:endParaRPr lang="en-NL"/>
           </a:p>
@@ -666,7 +671,7 @@
           <a:p>
             <a:fld id="{645AD960-D2B6-4147-9B4B-B3754CA6EB06}" type="datetimeFigureOut">
               <a:rPr lang="en-NL" smtClean="0"/>
-              <a:t>29/04/2021</a:t>
+              <a:t>30/04/2021</a:t>
             </a:fld>
             <a:endParaRPr lang="en-NL"/>
           </a:p>
@@ -866,7 +871,7 @@
           <a:p>
             <a:fld id="{645AD960-D2B6-4147-9B4B-B3754CA6EB06}" type="datetimeFigureOut">
               <a:rPr lang="en-NL" smtClean="0"/>
-              <a:t>29/04/2021</a:t>
+              <a:t>30/04/2021</a:t>
             </a:fld>
             <a:endParaRPr lang="en-NL"/>
           </a:p>
@@ -1142,7 +1147,7 @@
           <a:p>
             <a:fld id="{645AD960-D2B6-4147-9B4B-B3754CA6EB06}" type="datetimeFigureOut">
               <a:rPr lang="en-NL" smtClean="0"/>
-              <a:t>29/04/2021</a:t>
+              <a:t>30/04/2021</a:t>
             </a:fld>
             <a:endParaRPr lang="en-NL"/>
           </a:p>
@@ -1410,7 +1415,7 @@
           <a:p>
             <a:fld id="{645AD960-D2B6-4147-9B4B-B3754CA6EB06}" type="datetimeFigureOut">
               <a:rPr lang="en-NL" smtClean="0"/>
-              <a:t>29/04/2021</a:t>
+              <a:t>30/04/2021</a:t>
             </a:fld>
             <a:endParaRPr lang="en-NL"/>
           </a:p>
@@ -1825,7 +1830,7 @@
           <a:p>
             <a:fld id="{645AD960-D2B6-4147-9B4B-B3754CA6EB06}" type="datetimeFigureOut">
               <a:rPr lang="en-NL" smtClean="0"/>
-              <a:t>29/04/2021</a:t>
+              <a:t>30/04/2021</a:t>
             </a:fld>
             <a:endParaRPr lang="en-NL"/>
           </a:p>
@@ -1967,7 +1972,7 @@
           <a:p>
             <a:fld id="{645AD960-D2B6-4147-9B4B-B3754CA6EB06}" type="datetimeFigureOut">
               <a:rPr lang="en-NL" smtClean="0"/>
-              <a:t>29/04/2021</a:t>
+              <a:t>30/04/2021</a:t>
             </a:fld>
             <a:endParaRPr lang="en-NL"/>
           </a:p>
@@ -2080,7 +2085,7 @@
           <a:p>
             <a:fld id="{645AD960-D2B6-4147-9B4B-B3754CA6EB06}" type="datetimeFigureOut">
               <a:rPr lang="en-NL" smtClean="0"/>
-              <a:t>29/04/2021</a:t>
+              <a:t>30/04/2021</a:t>
             </a:fld>
             <a:endParaRPr lang="en-NL"/>
           </a:p>
@@ -2393,7 +2398,7 @@
           <a:p>
             <a:fld id="{645AD960-D2B6-4147-9B4B-B3754CA6EB06}" type="datetimeFigureOut">
               <a:rPr lang="en-NL" smtClean="0"/>
-              <a:t>29/04/2021</a:t>
+              <a:t>30/04/2021</a:t>
             </a:fld>
             <a:endParaRPr lang="en-NL"/>
           </a:p>
@@ -2682,7 +2687,7 @@
           <a:p>
             <a:fld id="{645AD960-D2B6-4147-9B4B-B3754CA6EB06}" type="datetimeFigureOut">
               <a:rPr lang="en-NL" smtClean="0"/>
-              <a:t>29/04/2021</a:t>
+              <a:t>30/04/2021</a:t>
             </a:fld>
             <a:endParaRPr lang="en-NL"/>
           </a:p>
@@ -2925,7 +2930,7 @@
           <a:p>
             <a:fld id="{645AD960-D2B6-4147-9B4B-B3754CA6EB06}" type="datetimeFigureOut">
               <a:rPr lang="en-NL" smtClean="0"/>
-              <a:t>29/04/2021</a:t>
+              <a:t>30/04/2021</a:t>
             </a:fld>
             <a:endParaRPr lang="en-NL"/>
           </a:p>
@@ -3766,10 +3771,10 @@
       </p:grpSp>
       <p:grpSp>
         <p:nvGrpSpPr>
-          <p:cNvPr id="17" name="Group 16">
-            <a:extLst>
-              <a:ext uri="{FF2B5EF4-FFF2-40B4-BE49-F238E27FC236}">
-                <a16:creationId xmlns:a16="http://schemas.microsoft.com/office/drawing/2014/main" id="{F54E4C8F-8633-4999-8772-3B0B485C1720}"/>
+          <p:cNvPr id="44" name="Group 43">
+            <a:extLst>
+              <a:ext uri="{FF2B5EF4-FFF2-40B4-BE49-F238E27FC236}">
+                <a16:creationId xmlns:a16="http://schemas.microsoft.com/office/drawing/2014/main" id="{4462237C-4A39-4A91-ADE0-D66158C2E1BE}"/>
               </a:ext>
             </a:extLst>
           </p:cNvPr>
@@ -3780,16 +3785,16 @@
           <a:xfrm>
             <a:off x="2309673" y="3734837"/>
             <a:ext cx="2675601" cy="1272128"/>
-            <a:chOff x="2309673" y="3690447"/>
+            <a:chOff x="2309673" y="3734837"/>
             <a:chExt cx="2675601" cy="1272128"/>
           </a:xfrm>
         </p:grpSpPr>
         <p:pic>
           <p:nvPicPr>
-            <p:cNvPr id="18" name="Picture 17">
+            <p:cNvPr id="3" name="Picture 2">
               <a:extLst>
                 <a:ext uri="{FF2B5EF4-FFF2-40B4-BE49-F238E27FC236}">
-                  <a16:creationId xmlns:a16="http://schemas.microsoft.com/office/drawing/2014/main" id="{1D8CE8D5-E9B6-463B-BE84-0B66EF7C90B0}"/>
+                  <a16:creationId xmlns:a16="http://schemas.microsoft.com/office/drawing/2014/main" id="{DF7BC389-5DAB-455C-8860-D2053E3D8CDD}"/>
                 </a:ext>
               </a:extLst>
             </p:cNvPr>
@@ -3806,8 +3811,8 @@
           </p:blipFill>
           <p:spPr>
             <a:xfrm>
-              <a:off x="2385087" y="3772659"/>
-              <a:ext cx="2600187" cy="1189916"/>
+              <a:off x="2363750" y="3756250"/>
+              <a:ext cx="2614322" cy="1213778"/>
             </a:xfrm>
             <a:prstGeom prst="rect">
               <a:avLst/>
@@ -3828,7 +3833,7 @@
           </p:nvSpPr>
           <p:spPr>
             <a:xfrm>
-              <a:off x="2309673" y="3690447"/>
+              <a:off x="2309673" y="3734837"/>
               <a:ext cx="2675601" cy="1272128"/>
             </a:xfrm>
             <a:prstGeom prst="rect">
@@ -4634,10 +4639,10 @@
       </p:cxnSp>
       <p:grpSp>
         <p:nvGrpSpPr>
-          <p:cNvPr id="41" name="Group 40">
-            <a:extLst>
-              <a:ext uri="{FF2B5EF4-FFF2-40B4-BE49-F238E27FC236}">
-                <a16:creationId xmlns:a16="http://schemas.microsoft.com/office/drawing/2014/main" id="{079F69F6-CF61-4146-80A8-91415E8FE1C3}"/>
+          <p:cNvPr id="47" name="Group 46">
+            <a:extLst>
+              <a:ext uri="{FF2B5EF4-FFF2-40B4-BE49-F238E27FC236}">
+                <a16:creationId xmlns:a16="http://schemas.microsoft.com/office/drawing/2014/main" id="{BA9E0732-C4F8-4B4C-8EE4-D9CB6C10B3E6}"/>
               </a:ext>
             </a:extLst>
           </p:cNvPr>
@@ -4701,10 +4706,10 @@
         </p:sp>
         <p:pic>
           <p:nvPicPr>
-            <p:cNvPr id="43" name="Picture 42">
+            <p:cNvPr id="46" name="Picture 45">
               <a:extLst>
                 <a:ext uri="{FF2B5EF4-FFF2-40B4-BE49-F238E27FC236}">
-                  <a16:creationId xmlns:a16="http://schemas.microsoft.com/office/drawing/2014/main" id="{1F77BCB4-5439-4A53-AE2E-F47560B1BB23}"/>
+                  <a16:creationId xmlns:a16="http://schemas.microsoft.com/office/drawing/2014/main" id="{29639C7C-7D36-4E6C-8AE6-28566F361C55}"/>
                 </a:ext>
               </a:extLst>
             </p:cNvPr>
@@ -4721,8 +4726,8 @@
           </p:blipFill>
           <p:spPr>
             <a:xfrm>
-              <a:off x="4633878" y="1179020"/>
-              <a:ext cx="2396669" cy="2324879"/>
+              <a:off x="4735138" y="1175050"/>
+              <a:ext cx="2238729" cy="2305634"/>
             </a:xfrm>
             <a:prstGeom prst="rect">
               <a:avLst/>

</xml_diff>